<commit_message>
removed ending slide due to potential copyright infringement
</commit_message>
<xml_diff>
--- a/presentations/mid2_PP/Jacob.pptx
+++ b/presentations/mid2_PP/Jacob.pptx
@@ -5,10 +5,10 @@
     <p:sldMasterId id="2147483649" r:id="rId1"/>
   </p:sldMasterIdLst>
   <p:notesMasterIdLst>
-    <p:notesMasterId r:id="rId27"/>
+    <p:notesMasterId r:id="rId26"/>
   </p:notesMasterIdLst>
   <p:handoutMasterIdLst>
-    <p:handoutMasterId r:id="rId28"/>
+    <p:handoutMasterId r:id="rId27"/>
   </p:handoutMasterIdLst>
   <p:sldIdLst>
     <p:sldId id="576" r:id="rId2"/>
@@ -35,11 +35,14 @@
     <p:sldId id="598" r:id="rId23"/>
     <p:sldId id="599" r:id="rId24"/>
     <p:sldId id="600" r:id="rId25"/>
-    <p:sldId id="601" r:id="rId26"/>
   </p:sldIdLst>
   <p:sldSz cx="9144000" cy="6858000" type="screen4x3"/>
   <p:notesSz cx="6950075" cy="9236075"/>
   <p:embeddedFontLst>
+    <p:embeddedFont>
+      <p:font typeface="Cambria Math" panose="02040503050406030204" pitchFamily="18" charset="0"/>
+      <p:regular r:id="rId28"/>
+    </p:embeddedFont>
     <p:embeddedFont>
       <p:font typeface="Tahoma" panose="020B0604030504040204" pitchFamily="34" charset="0"/>
       <p:regular r:id="rId29"/>
@@ -65,10 +68,6 @@
       <p:bold r:id="rId40"/>
       <p:italic r:id="rId41"/>
       <p:boldItalic r:id="rId42"/>
-    </p:embeddedFont>
-    <p:embeddedFont>
-      <p:font typeface="Cambria Math" panose="02040503050406030204" pitchFamily="18" charset="0"/>
-      <p:regular r:id="rId43"/>
     </p:embeddedFont>
   </p:embeddedFontLst>
   <p:defaultTextStyle>
@@ -3653,11 +3652,11 @@
           <c:showPercent val="0"/>
           <c:showBubbleSize val="0"/>
         </c:dLbls>
-        <c:axId val="347093456"/>
-        <c:axId val="347094016"/>
+        <c:axId val="160110224"/>
+        <c:axId val="160109664"/>
       </c:scatterChart>
       <c:valAx>
-        <c:axId val="347093456"/>
+        <c:axId val="160110224"/>
         <c:scaling>
           <c:logBase val="10"/>
           <c:orientation val="minMax"/>
@@ -3705,7 +3704,6 @@
               </a:p>
             </c:rich>
           </c:tx>
-          <c:layout/>
           <c:overlay val="0"/>
           <c:spPr>
             <a:noFill/>
@@ -3772,12 +3770,12 @@
             <a:endParaRPr lang="en-US"/>
           </a:p>
         </c:txPr>
-        <c:crossAx val="347094016"/>
+        <c:crossAx val="160109664"/>
         <c:crosses val="autoZero"/>
         <c:crossBetween val="midCat"/>
       </c:valAx>
       <c:valAx>
-        <c:axId val="347094016"/>
+        <c:axId val="160109664"/>
         <c:scaling>
           <c:logBase val="10"/>
           <c:orientation val="minMax"/>
@@ -3837,7 +3835,7 @@
             <a:endParaRPr lang="en-US"/>
           </a:p>
         </c:txPr>
-        <c:crossAx val="347093456"/>
+        <c:crossAx val="160110224"/>
         <c:crosses val="autoZero"/>
         <c:crossBetween val="midCat"/>
       </c:valAx>
@@ -4285,8 +4283,8 @@
           <c:showPercent val="0"/>
           <c:showBubbleSize val="0"/>
         </c:dLbls>
-        <c:axId val="215215568"/>
-        <c:axId val="215216128"/>
+        <c:axId val="208354032"/>
+        <c:axId val="208538960"/>
         <c:extLst xmlns:c16r2="http://schemas.microsoft.com/office/drawing/2015/06/chart">
           <c:ext xmlns:c15="http://schemas.microsoft.com/office/drawing/2012/chart" uri="{02D57815-91ED-43cb-92C2-25804820EDAC}">
             <c15:filteredScatterSeries>
@@ -4392,7 +4390,7 @@
         </c:extLst>
       </c:scatterChart>
       <c:valAx>
-        <c:axId val="215215568"/>
+        <c:axId val="208354032"/>
         <c:scaling>
           <c:orientation val="minMax"/>
         </c:scaling>
@@ -4433,7 +4431,6 @@
               </a:p>
             </c:rich>
           </c:tx>
-          <c:layout/>
           <c:overlay val="0"/>
           <c:spPr>
             <a:noFill/>
@@ -4500,12 +4497,12 @@
             <a:endParaRPr lang="en-US"/>
           </a:p>
         </c:txPr>
-        <c:crossAx val="215216128"/>
+        <c:crossAx val="208538960"/>
         <c:crosses val="autoZero"/>
         <c:crossBetween val="midCat"/>
       </c:valAx>
       <c:valAx>
-        <c:axId val="215216128"/>
+        <c:axId val="208538960"/>
         <c:scaling>
           <c:orientation val="minMax"/>
           <c:min val="0"/>
@@ -4547,7 +4544,6 @@
               </a:p>
             </c:rich>
           </c:tx>
-          <c:layout/>
           <c:overlay val="0"/>
           <c:spPr>
             <a:noFill/>
@@ -4614,7 +4610,7 @@
             <a:endParaRPr lang="en-US"/>
           </a:p>
         </c:txPr>
-        <c:crossAx val="215215568"/>
+        <c:crossAx val="208354032"/>
         <c:crosses val="autoZero"/>
         <c:crossBetween val="midCat"/>
       </c:valAx>
@@ -4628,7 +4624,6 @@
     </c:plotArea>
     <c:legend>
       <c:legendPos val="r"/>
-      <c:layout/>
       <c:overlay val="0"/>
       <c:spPr>
         <a:noFill/>
@@ -8443,14 +8438,14 @@
           <a:effectLst/>
           <a:extLst>
             <a:ext uri="{909E8E84-426E-40dd-AFC4-6F175D3DCCD1}">
-              <a14:hiddenFill xmlns:a14="http://schemas.microsoft.com/office/drawing/2010/main" xmlns="">
+              <a14:hiddenFill xmlns="" xmlns:a14="http://schemas.microsoft.com/office/drawing/2010/main">
                 <a:solidFill>
                   <a:schemeClr val="accent1"/>
                 </a:solidFill>
               </a14:hiddenFill>
             </a:ext>
             <a:ext uri="{91240B29-F687-4f45-9708-019B960494DF}">
-              <a14:hiddenLine xmlns:a14="http://schemas.microsoft.com/office/drawing/2010/main" xmlns="" w="9525">
+              <a14:hiddenLine xmlns="" xmlns:a14="http://schemas.microsoft.com/office/drawing/2010/main" w="9525">
                 <a:solidFill>
                   <a:schemeClr val="tx1"/>
                 </a:solidFill>
@@ -8460,7 +8455,7 @@
               </a14:hiddenLine>
             </a:ext>
             <a:ext uri="{AF507438-7753-43e0-B8FC-AC1667EBCBE1}">
-              <a14:hiddenEffects xmlns:a14="http://schemas.microsoft.com/office/drawing/2010/main" xmlns="">
+              <a14:hiddenEffects xmlns="" xmlns:a14="http://schemas.microsoft.com/office/drawing/2010/main">
                 <a:effectLst>
                   <a:outerShdw dist="35921" dir="2700000" algn="ctr" rotWithShape="0">
                     <a:schemeClr val="bg2"/>
@@ -9366,7 +9361,7 @@
           <a:noFill/>
           <a:extLst>
             <a:ext uri="{909E8E84-426E-40dd-AFC4-6F175D3DCCD1}">
-              <a14:hiddenFill xmlns:a14="http://schemas.microsoft.com/office/drawing/2010/main" xmlns="">
+              <a14:hiddenFill xmlns="" xmlns:a14="http://schemas.microsoft.com/office/drawing/2010/main">
                 <a:solidFill>
                   <a:srgbClr val="FFFFFF"/>
                 </a:solidFill>
@@ -10339,7 +10334,7 @@
           <p:cNvPr id="5" name="Chart 4">
             <a:extLst>
               <a:ext uri="{FF2B5EF4-FFF2-40B4-BE49-F238E27FC236}">
-                <a16:creationId xmlns:a16="http://schemas.microsoft.com/office/drawing/2014/main" xmlns="" id="{00000000-0008-0000-0100-000003000000}"/>
+                <a16:creationId xmlns="" xmlns:a16="http://schemas.microsoft.com/office/drawing/2014/main" id="{00000000-0008-0000-0100-000003000000}"/>
               </a:ext>
             </a:extLst>
           </p:cNvPr>
@@ -15113,8 +15108,8 @@
           </a:p>
         </p:txBody>
       </p:sp>
-      <mc:AlternateContent xmlns:mc="http://schemas.openxmlformats.org/markup-compatibility/2006">
-        <mc:Choice xmlns:a14="http://schemas.microsoft.com/office/drawing/2010/main" Requires="a14">
+      <mc:AlternateContent xmlns:mc="http://schemas.openxmlformats.org/markup-compatibility/2006" xmlns:a14="http://schemas.microsoft.com/office/drawing/2010/main">
+        <mc:Choice Requires="a14">
           <p:sp>
             <p:nvSpPr>
               <p:cNvPr id="3" name="Content Placeholder 2"/>
@@ -15266,7 +15261,7 @@
             </p:txBody>
           </p:sp>
         </mc:Choice>
-        <mc:Fallback>
+        <mc:Fallback xmlns="">
           <p:sp>
             <p:nvSpPr>
               <p:cNvPr id="3" name="Content Placeholder 2"/>
@@ -20887,86 +20882,6 @@
 </p:sld>
 </file>
 
-<file path=ppt/slides/slide25.xml><?xml version="1.0" encoding="utf-8"?>
-<p:sld xmlns:a="http://schemas.openxmlformats.org/drawingml/2006/main" xmlns:r="http://schemas.openxmlformats.org/officeDocument/2006/relationships" xmlns:p="http://schemas.openxmlformats.org/presentationml/2006/main" showMasterSp="0">
-  <p:cSld>
-    <p:bg>
-      <p:bgPr>
-        <a:blipFill dpi="0" rotWithShape="1">
-          <a:blip r:embed="rId2">
-            <a:lum/>
-          </a:blip>
-          <a:srcRect/>
-          <a:stretch>
-            <a:fillRect l="-17000" r="-17000"/>
-          </a:stretch>
-        </a:blipFill>
-        <a:effectLst/>
-      </p:bgPr>
-    </p:bg>
-    <p:spTree>
-      <p:nvGrpSpPr>
-        <p:cNvPr id="1" name=""/>
-        <p:cNvGrpSpPr/>
-        <p:nvPr/>
-      </p:nvGrpSpPr>
-      <p:grpSpPr>
-        <a:xfrm>
-          <a:off x="0" y="0"/>
-          <a:ext cx="0" cy="0"/>
-          <a:chOff x="0" y="0"/>
-          <a:chExt cx="0" cy="0"/>
-        </a:xfrm>
-      </p:grpSpPr>
-      <p:sp>
-        <p:nvSpPr>
-          <p:cNvPr id="4" name="Slide Number Placeholder 3"/>
-          <p:cNvSpPr>
-            <a:spLocks noGrp="1"/>
-          </p:cNvSpPr>
-          <p:nvPr>
-            <p:ph type="sldNum" sz="quarter" idx="10"/>
-          </p:nvPr>
-        </p:nvSpPr>
-        <p:spPr/>
-        <p:txBody>
-          <a:bodyPr/>
-          <a:lstStyle/>
-          <a:p>
-            <a:pPr>
-              <a:defRPr/>
-            </a:pPr>
-            <a:fld id="{639E97B8-4532-408E-A5F7-ACF05B64D361}" type="slidenum">
-              <a:rPr lang="en-US" smtClean="0"/>
-              <a:pPr>
-                <a:defRPr/>
-              </a:pPr>
-              <a:t>25</a:t>
-            </a:fld>
-            <a:endParaRPr lang="en-US" dirty="0"/>
-          </a:p>
-        </p:txBody>
-      </p:sp>
-    </p:spTree>
-    <p:extLst>
-      <p:ext uri="{BB962C8B-B14F-4D97-AF65-F5344CB8AC3E}">
-        <p14:creationId xmlns:p14="http://schemas.microsoft.com/office/powerpoint/2010/main" val="3032700324"/>
-      </p:ext>
-    </p:extLst>
-  </p:cSld>
-  <p:clrMapOvr>
-    <a:masterClrMapping/>
-  </p:clrMapOvr>
-  <p:timing>
-    <p:tnLst>
-      <p:par>
-        <p:cTn id="1" dur="indefinite" restart="never" nodeType="tmRoot"/>
-      </p:par>
-    </p:tnLst>
-  </p:timing>
-</p:sld>
-</file>
-
 <file path=ppt/slides/slide3.xml><?xml version="1.0" encoding="utf-8"?>
 <p:sld xmlns:a="http://schemas.openxmlformats.org/drawingml/2006/main" xmlns:r="http://schemas.openxmlformats.org/officeDocument/2006/relationships" xmlns:p="http://schemas.openxmlformats.org/presentationml/2006/main">
   <p:cSld>
@@ -21036,42 +20951,42 @@
                 <a:gridCol w="1252220">
                   <a:extLst>
                     <a:ext uri="{9D8B030D-6E8A-4147-A177-3AD203B41FA5}">
-                      <a16:colId xmlns:a16="http://schemas.microsoft.com/office/drawing/2014/main" xmlns="" val="20000"/>
+                      <a16:colId xmlns="" xmlns:a16="http://schemas.microsoft.com/office/drawing/2014/main" val="20000"/>
                     </a:ext>
                   </a:extLst>
                 </a:gridCol>
                 <a:gridCol w="1694180">
                   <a:extLst>
                     <a:ext uri="{9D8B030D-6E8A-4147-A177-3AD203B41FA5}">
-                      <a16:colId xmlns:a16="http://schemas.microsoft.com/office/drawing/2014/main" xmlns="" val="20001"/>
+                      <a16:colId xmlns="" xmlns:a16="http://schemas.microsoft.com/office/drawing/2014/main" val="20001"/>
                     </a:ext>
                   </a:extLst>
                 </a:gridCol>
                 <a:gridCol w="1473200">
                   <a:extLst>
                     <a:ext uri="{9D8B030D-6E8A-4147-A177-3AD203B41FA5}">
-                      <a16:colId xmlns:a16="http://schemas.microsoft.com/office/drawing/2014/main" xmlns="" val="20002"/>
+                      <a16:colId xmlns="" xmlns:a16="http://schemas.microsoft.com/office/drawing/2014/main" val="20002"/>
                     </a:ext>
                   </a:extLst>
                 </a:gridCol>
                 <a:gridCol w="1473200">
                   <a:extLst>
                     <a:ext uri="{9D8B030D-6E8A-4147-A177-3AD203B41FA5}">
-                      <a16:colId xmlns:a16="http://schemas.microsoft.com/office/drawing/2014/main" xmlns="" val="20003"/>
+                      <a16:colId xmlns="" xmlns:a16="http://schemas.microsoft.com/office/drawing/2014/main" val="20003"/>
                     </a:ext>
                   </a:extLst>
                 </a:gridCol>
                 <a:gridCol w="1473200">
                   <a:extLst>
                     <a:ext uri="{9D8B030D-6E8A-4147-A177-3AD203B41FA5}">
-                      <a16:colId xmlns:a16="http://schemas.microsoft.com/office/drawing/2014/main" xmlns="" val="20004"/>
+                      <a16:colId xmlns="" xmlns:a16="http://schemas.microsoft.com/office/drawing/2014/main" val="20004"/>
                     </a:ext>
                   </a:extLst>
                 </a:gridCol>
                 <a:gridCol w="1473200">
                   <a:extLst>
                     <a:ext uri="{9D8B030D-6E8A-4147-A177-3AD203B41FA5}">
-                      <a16:colId xmlns:a16="http://schemas.microsoft.com/office/drawing/2014/main" xmlns="" val="1357031864"/>
+                      <a16:colId xmlns="" xmlns:a16="http://schemas.microsoft.com/office/drawing/2014/main" val="1357031864"/>
                     </a:ext>
                   </a:extLst>
                 </a:gridCol>
@@ -21173,7 +21088,7 @@
                 </a:tc>
                 <a:extLst>
                   <a:ext uri="{0D108BD9-81ED-4DB2-BD59-A6C34878D82A}">
-                    <a16:rowId xmlns:a16="http://schemas.microsoft.com/office/drawing/2014/main" xmlns="" val="10000"/>
+                    <a16:rowId xmlns="" xmlns:a16="http://schemas.microsoft.com/office/drawing/2014/main" val="10000"/>
                   </a:ext>
                 </a:extLst>
               </a:tr>
@@ -21269,7 +21184,7 @@
                 </a:tc>
                 <a:extLst>
                   <a:ext uri="{0D108BD9-81ED-4DB2-BD59-A6C34878D82A}">
-                    <a16:rowId xmlns:a16="http://schemas.microsoft.com/office/drawing/2014/main" xmlns="" val="10001"/>
+                    <a16:rowId xmlns="" xmlns:a16="http://schemas.microsoft.com/office/drawing/2014/main" val="10001"/>
                   </a:ext>
                 </a:extLst>
               </a:tr>
@@ -21365,7 +21280,7 @@
                 </a:tc>
                 <a:extLst>
                   <a:ext uri="{0D108BD9-81ED-4DB2-BD59-A6C34878D82A}">
-                    <a16:rowId xmlns:a16="http://schemas.microsoft.com/office/drawing/2014/main" xmlns="" val="10002"/>
+                    <a16:rowId xmlns="" xmlns:a16="http://schemas.microsoft.com/office/drawing/2014/main" val="10002"/>
                   </a:ext>
                 </a:extLst>
               </a:tr>
@@ -21462,7 +21377,7 @@
                 </a:tc>
                 <a:extLst>
                   <a:ext uri="{0D108BD9-81ED-4DB2-BD59-A6C34878D82A}">
-                    <a16:rowId xmlns:a16="http://schemas.microsoft.com/office/drawing/2014/main" xmlns="" val="10003"/>
+                    <a16:rowId xmlns="" xmlns:a16="http://schemas.microsoft.com/office/drawing/2014/main" val="10003"/>
                   </a:ext>
                 </a:extLst>
               </a:tr>
@@ -21559,7 +21474,7 @@
                 </a:tc>
                 <a:extLst>
                   <a:ext uri="{0D108BD9-81ED-4DB2-BD59-A6C34878D82A}">
-                    <a16:rowId xmlns:a16="http://schemas.microsoft.com/office/drawing/2014/main" xmlns="" val="10004"/>
+                    <a16:rowId xmlns="" xmlns:a16="http://schemas.microsoft.com/office/drawing/2014/main" val="10004"/>
                   </a:ext>
                 </a:extLst>
               </a:tr>
@@ -21656,7 +21571,7 @@
                 </a:tc>
                 <a:extLst>
                   <a:ext uri="{0D108BD9-81ED-4DB2-BD59-A6C34878D82A}">
-                    <a16:rowId xmlns:a16="http://schemas.microsoft.com/office/drawing/2014/main" xmlns="" val="10005"/>
+                    <a16:rowId xmlns="" xmlns:a16="http://schemas.microsoft.com/office/drawing/2014/main" val="10005"/>
                   </a:ext>
                 </a:extLst>
               </a:tr>

</xml_diff>